<commit_message>
added "ethical and other aspects"
added q5 "ethical and other aspects" as bulletpoint list/summary
</commit_message>
<xml_diff>
--- a/Poster/BDM_poster.pptx
+++ b/Poster/BDM_poster.pptx
@@ -6975,7 +6975,7 @@
                 </a:solidFill>
                 <a:latin typeface="Calibri" charset="0"/>
               </a:rPr>
-              <a:t> (0000000) &amp; Rik </a:t>
+              <a:t> (1479652) &amp; Rik </a:t>
             </a:r>
             <a:r>
               <a:rPr lang="en-US" sz="1800" b="1" dirty="0" err="1">
@@ -6993,7 +6993,7 @@
                 </a:solidFill>
                 <a:latin typeface="Calibri" charset="0"/>
               </a:rPr>
-              <a:t> (0000000) &amp; Marco </a:t>
+              <a:t> (1317059) &amp; Marco </a:t>
             </a:r>
             <a:r>
               <a:rPr lang="en-US" sz="1800" b="1" dirty="0" err="1">
@@ -7011,7 +7011,7 @@
                 </a:solidFill>
                 <a:latin typeface="Calibri" charset="0"/>
               </a:rPr>
-              <a:t> (0000000)</a:t>
+              <a:t> (1295713)</a:t>
             </a:r>
           </a:p>
         </p:txBody>
@@ -10161,54 +10161,6 @@
             </a:r>
           </a:p>
           <a:p>
-            <a:pPr marL="285750" indent="-285750" defTabSz="2949575">
-              <a:lnSpc>
-                <a:spcPts val="3200"/>
-              </a:lnSpc>
-              <a:buFontTx/>
-              <a:buChar char="-"/>
-              <a:defRPr/>
-            </a:pPr>
-            <a:endParaRPr lang="en-NL" sz="1800" dirty="0">
-              <a:effectLst/>
-              <a:latin typeface="Arial" panose="020B0604020202020204" pitchFamily="34" charset="0"/>
-              <a:ea typeface="Calibri" panose="020F0502020204030204" pitchFamily="34" charset="0"/>
-            </a:endParaRPr>
-          </a:p>
-          <a:p>
-            <a:pPr marL="0" marR="0" lvl="0" indent="0" algn="l" defTabSz="2949575" rtl="0" eaLnBrk="1" fontAlgn="base" latinLnBrk="0" hangingPunct="1">
-              <a:lnSpc>
-                <a:spcPts val="3200"/>
-              </a:lnSpc>
-              <a:spcBef>
-                <a:spcPct val="0"/>
-              </a:spcBef>
-              <a:spcAft>
-                <a:spcPct val="0"/>
-              </a:spcAft>
-              <a:buClrTx/>
-              <a:buSzTx/>
-              <a:buFontTx/>
-              <a:buNone/>
-              <a:tabLst/>
-              <a:defRPr/>
-            </a:pPr>
-            <a:endParaRPr kumimoji="0" lang="en-NL" sz="1800" b="0" i="0" u="none" strike="noStrike" kern="1200" cap="none" spc="0" normalizeH="0" baseline="0" noProof="0" dirty="0">
-              <a:ln>
-                <a:noFill/>
-              </a:ln>
-              <a:solidFill>
-                <a:srgbClr val="101073"/>
-              </a:solidFill>
-              <a:effectLst/>
-              <a:uLnTx/>
-              <a:uFillTx/>
-              <a:latin typeface="Arial" panose="020B0604020202020204" pitchFamily="34" charset="0"/>
-              <a:ea typeface="Calibri" panose="020F0502020204030204" pitchFamily="34" charset="0"/>
-              <a:cs typeface="+mn-cs"/>
-            </a:endParaRPr>
-          </a:p>
-          <a:p>
             <a:pPr marL="0" marR="0" lvl="0" indent="0" algn="l" defTabSz="2949575" rtl="0" eaLnBrk="1" fontAlgn="base" latinLnBrk="0" hangingPunct="1">
               <a:lnSpc>
                 <a:spcPts val="3200"/>
@@ -10292,8 +10244,8 @@
         </p:nvSpPr>
         <p:spPr bwMode="auto">
           <a:xfrm>
-            <a:off x="9769599" y="26235601"/>
-            <a:ext cx="11237538" cy="3663829"/>
+            <a:off x="9769599" y="24901921"/>
+            <a:ext cx="11237538" cy="4981450"/>
           </a:xfrm>
           <a:prstGeom prst="rect">
             <a:avLst/>
@@ -10411,15 +10363,26 @@
               <a:tabLst/>
               <a:defRPr/>
             </a:pPr>
-            <a:endParaRPr lang="en-US" sz="2400" dirty="0">
-              <a:solidFill>
-                <a:srgbClr val="000000"/>
-              </a:solidFill>
-              <a:latin typeface="Calibri" charset="0"/>
-            </a:endParaRPr>
+            <a:r>
+              <a:rPr kumimoji="0" lang="en-US" sz="2400" b="0" i="0" u="none" strike="noStrike" kern="1200" cap="none" spc="0" normalizeH="0" baseline="0" noProof="0" dirty="0">
+                <a:ln>
+                  <a:noFill/>
+                </a:ln>
+                <a:solidFill>
+                  <a:srgbClr val="101073"/>
+                </a:solidFill>
+                <a:effectLst/>
+                <a:uLnTx/>
+                <a:uFillTx/>
+                <a:latin typeface="Arial" panose="020B0604020202020204" pitchFamily="34" charset="0"/>
+                <a:ea typeface="Calibri" panose="020F0502020204030204" pitchFamily="34" charset="0"/>
+                <a:cs typeface="+mn-cs"/>
+              </a:rPr>
+              <a:t>To compute variances for a large dataset, there are various options:</a:t>
+            </a:r>
           </a:p>
           <a:p>
-            <a:pPr marL="0" marR="0" lvl="0" indent="0" algn="l" defTabSz="2949575" rtl="0" eaLnBrk="1" fontAlgn="base" latinLnBrk="0" hangingPunct="1">
+            <a:pPr marL="342900" marR="0" lvl="0" indent="-342900" algn="l" defTabSz="2949575" rtl="0" eaLnBrk="1" fontAlgn="base" latinLnBrk="0" hangingPunct="1">
               <a:lnSpc>
                 <a:spcPts val="3200"/>
               </a:lnSpc>
@@ -10432,19 +10395,30 @@
               <a:buClrTx/>
               <a:buSzTx/>
               <a:buFontTx/>
-              <a:buNone/>
+              <a:buChar char="-"/>
               <a:tabLst/>
               <a:defRPr/>
             </a:pPr>
-            <a:endParaRPr lang="en-US" sz="2400" dirty="0">
-              <a:solidFill>
-                <a:srgbClr val="000000"/>
-              </a:solidFill>
-              <a:latin typeface="Calibri" charset="0"/>
-            </a:endParaRPr>
+            <a:r>
+              <a:rPr kumimoji="0" lang="en-US" sz="2400" b="0" i="0" u="none" strike="noStrike" kern="1200" cap="none" spc="0" normalizeH="0" baseline="0" noProof="0" dirty="0">
+                <a:ln>
+                  <a:noFill/>
+                </a:ln>
+                <a:solidFill>
+                  <a:srgbClr val="101073"/>
+                </a:solidFill>
+                <a:effectLst/>
+                <a:uLnTx/>
+                <a:uFillTx/>
+                <a:latin typeface="Arial" panose="020B0604020202020204" pitchFamily="34" charset="0"/>
+                <a:ea typeface="Calibri" panose="020F0502020204030204" pitchFamily="34" charset="0"/>
+                <a:cs typeface="+mn-cs"/>
+              </a:rPr>
+              <a:t>Relational databases can quickly compute results using query optimization but do not utilize distributed computing.</a:t>
+            </a:r>
           </a:p>
           <a:p>
-            <a:pPr marL="0" marR="0" lvl="0" indent="0" algn="l" defTabSz="2949575" rtl="0" eaLnBrk="1" fontAlgn="base" latinLnBrk="0" hangingPunct="1">
+            <a:pPr marL="342900" marR="0" lvl="0" indent="-342900" algn="l" defTabSz="2949575" rtl="0" eaLnBrk="1" fontAlgn="base" latinLnBrk="0" hangingPunct="1">
               <a:lnSpc>
                 <a:spcPts val="3200"/>
               </a:lnSpc>
@@ -10457,19 +10431,30 @@
               <a:buClrTx/>
               <a:buSzTx/>
               <a:buFontTx/>
-              <a:buNone/>
+              <a:buChar char="-"/>
               <a:tabLst/>
               <a:defRPr/>
             </a:pPr>
-            <a:endParaRPr lang="en-US" sz="2400" dirty="0">
-              <a:solidFill>
-                <a:srgbClr val="000000"/>
-              </a:solidFill>
-              <a:latin typeface="Calibri" charset="0"/>
-            </a:endParaRPr>
+            <a:r>
+              <a:rPr kumimoji="0" lang="en-US" sz="2400" b="0" i="0" u="none" strike="noStrike" kern="1200" cap="none" spc="0" normalizeH="0" baseline="0" noProof="0" dirty="0">
+                <a:ln>
+                  <a:noFill/>
+                </a:ln>
+                <a:solidFill>
+                  <a:srgbClr val="101073"/>
+                </a:solidFill>
+                <a:effectLst/>
+                <a:uLnTx/>
+                <a:uFillTx/>
+                <a:latin typeface="Arial" panose="020B0604020202020204" pitchFamily="34" charset="0"/>
+                <a:ea typeface="Calibri" panose="020F0502020204030204" pitchFamily="34" charset="0"/>
+                <a:cs typeface="+mn-cs"/>
+              </a:rPr>
+              <a:t>Multi-threaded programs on powerful servers are fast but may have communication issues between threads.</a:t>
+            </a:r>
           </a:p>
           <a:p>
-            <a:pPr marL="0" marR="0" lvl="0" indent="0" algn="l" defTabSz="2949575" rtl="0" eaLnBrk="1" fontAlgn="base" latinLnBrk="0" hangingPunct="1">
+            <a:pPr marL="342900" marR="0" lvl="0" indent="-342900" algn="l" defTabSz="2949575" rtl="0" eaLnBrk="1" fontAlgn="base" latinLnBrk="0" hangingPunct="1">
               <a:lnSpc>
                 <a:spcPts val="3200"/>
               </a:lnSpc>
@@ -10482,19 +10467,30 @@
               <a:buClrTx/>
               <a:buSzTx/>
               <a:buFontTx/>
-              <a:buNone/>
+              <a:buChar char="-"/>
               <a:tabLst/>
               <a:defRPr/>
             </a:pPr>
-            <a:endParaRPr lang="en-US" sz="2400" dirty="0">
-              <a:solidFill>
-                <a:srgbClr val="000000"/>
-              </a:solidFill>
-              <a:latin typeface="Calibri" charset="0"/>
-            </a:endParaRPr>
+            <a:r>
+              <a:rPr kumimoji="0" lang="en-US" sz="2400" b="0" i="0" u="none" strike="noStrike" kern="1200" cap="none" spc="0" normalizeH="0" baseline="0" noProof="0" dirty="0">
+                <a:ln>
+                  <a:noFill/>
+                </a:ln>
+                <a:solidFill>
+                  <a:srgbClr val="101073"/>
+                </a:solidFill>
+                <a:effectLst/>
+                <a:uLnTx/>
+                <a:uFillTx/>
+                <a:latin typeface="Arial" panose="020B0604020202020204" pitchFamily="34" charset="0"/>
+                <a:ea typeface="Calibri" panose="020F0502020204030204" pitchFamily="34" charset="0"/>
+                <a:cs typeface="+mn-cs"/>
+              </a:rPr>
+              <a:t>Company-owned clusters provide control and privacy, but require initial investment, while cloud resources offer scalability at higher cost. </a:t>
+            </a:r>
           </a:p>
           <a:p>
-            <a:pPr marL="0" marR="0" lvl="0" indent="0" algn="l" defTabSz="2949575" rtl="0" eaLnBrk="1" fontAlgn="base" latinLnBrk="0" hangingPunct="1">
+            <a:pPr marL="342900" marR="0" lvl="0" indent="-342900" algn="l" defTabSz="2949575" rtl="0" eaLnBrk="1" fontAlgn="base" latinLnBrk="0" hangingPunct="1">
               <a:lnSpc>
                 <a:spcPts val="3200"/>
               </a:lnSpc>
@@ -10507,60 +10503,27 @@
               <a:buClrTx/>
               <a:buSzTx/>
               <a:buFontTx/>
-              <a:buNone/>
+              <a:buChar char="-"/>
               <a:tabLst/>
               <a:defRPr/>
             </a:pPr>
-            <a:endParaRPr lang="en-US" sz="2400" dirty="0">
-              <a:solidFill>
-                <a:srgbClr val="000000"/>
-              </a:solidFill>
-              <a:latin typeface="Calibri" charset="0"/>
-            </a:endParaRPr>
-          </a:p>
-          <a:p>
-            <a:pPr marL="0" marR="0" lvl="0" indent="0" algn="l" defTabSz="2949575" rtl="0" eaLnBrk="1" fontAlgn="base" latinLnBrk="0" hangingPunct="1">
-              <a:lnSpc>
-                <a:spcPts val="3200"/>
-              </a:lnSpc>
-              <a:spcBef>
-                <a:spcPct val="0"/>
-              </a:spcBef>
-              <a:spcAft>
-                <a:spcPct val="0"/>
-              </a:spcAft>
-              <a:buClrTx/>
-              <a:buSzTx/>
-              <a:buFontTx/>
-              <a:buNone/>
-              <a:tabLst/>
-              <a:defRPr/>
-            </a:pPr>
-            <a:endParaRPr lang="en-US" sz="2400" dirty="0">
-              <a:solidFill>
-                <a:srgbClr val="000000"/>
-              </a:solidFill>
-              <a:latin typeface="Calibri" charset="0"/>
-            </a:endParaRPr>
-          </a:p>
-          <a:p>
-            <a:pPr marL="0" marR="0" lvl="0" indent="0" algn="l" defTabSz="2949575" rtl="0" eaLnBrk="1" fontAlgn="base" latinLnBrk="0" hangingPunct="1">
-              <a:lnSpc>
-                <a:spcPts val="3200"/>
-              </a:lnSpc>
-              <a:spcBef>
-                <a:spcPct val="0"/>
-              </a:spcBef>
-              <a:spcAft>
-                <a:spcPct val="0"/>
-              </a:spcAft>
-              <a:buClrTx/>
-              <a:buSzTx/>
-              <a:buFontTx/>
-              <a:buNone/>
-              <a:tabLst/>
-              <a:defRPr/>
-            </a:pPr>
+            <a:r>
+              <a:rPr kumimoji="0" lang="en-US" sz="2400" b="0" i="0" u="none" strike="noStrike" kern="1200" cap="none" spc="0" normalizeH="0" baseline="0" noProof="0" dirty="0">
+                <a:ln>
+                  <a:noFill/>
+                </a:ln>
+                <a:solidFill>
+                  <a:srgbClr val="101073"/>
+                </a:solidFill>
+                <a:effectLst/>
+                <a:uLnTx/>
+                <a:uFillTx/>
+                <a:latin typeface="Arial" panose="020B0604020202020204" pitchFamily="34" charset="0"/>
+                <a:ea typeface="Calibri" panose="020F0502020204030204" pitchFamily="34" charset="0"/>
+                <a:cs typeface="+mn-cs"/>
+              </a:rPr>
+              <a:t>Approximation techniques are suitable when error bounds are acceptable, while Spark can precisely calculate results.</a:t>
+            </a:r>
             <a:endParaRPr lang="en-US" sz="2400" dirty="0">
               <a:solidFill>
                 <a:srgbClr val="000000"/>

</xml_diff>